<commit_message>
added new version of pptx
</commit_message>
<xml_diff>
--- a/Sycker.pptx
+++ b/Sycker.pptx
@@ -10,6 +10,9 @@
     <p:sldId id="258" r:id="rId4"/>
     <p:sldId id="260" r:id="rId5"/>
     <p:sldId id="261" r:id="rId6"/>
+    <p:sldId id="262" r:id="rId7"/>
+    <p:sldId id="264" r:id="rId8"/>
+    <p:sldId id="266" r:id="rId9"/>
   </p:sldIdLst>
   <p:sldSz cx="12192000" cy="6858000"/>
   <p:notesSz cx="6858000" cy="9144000"/>
@@ -108,6 +111,11 @@
       </a:defRPr>
     </a:lvl9pPr>
   </p:defaultTextStyle>
+  <p:extLst>
+    <p:ext uri="{EFAFB233-063F-42B5-8137-9DF3F51BA10A}">
+      <p15:sldGuideLst xmlns:p15="http://schemas.microsoft.com/office/powerpoint/2012/main"/>
+    </p:ext>
+  </p:extLst>
 </p:presentation>
 </file>
 
@@ -355,7 +363,7 @@
           <a:p>
             <a:fld id="{9184DA70-C731-4C70-880D-CCD4705E623C}" type="datetime1">
               <a:rPr lang="en-US" smtClean="0"/>
-              <a:t>1/4/2021</a:t>
+              <a:t>1/5/2021</a:t>
             </a:fld>
             <a:endParaRPr lang="en-US" dirty="0"/>
           </a:p>
@@ -543,7 +551,7 @@
           <a:p>
             <a:fld id="{B612A279-0833-481D-8C56-F67FD0AC6C50}" type="datetime1">
               <a:rPr lang="en-US" smtClean="0"/>
-              <a:t>1/4/2021</a:t>
+              <a:t>1/5/2021</a:t>
             </a:fld>
             <a:endParaRPr lang="en-US" dirty="0"/>
           </a:p>
@@ -785,7 +793,7 @@
           <a:p>
             <a:fld id="{6587DA83-5663-4C9C-B9AA-0B40A3DAFF81}" type="datetime1">
               <a:rPr lang="en-US" smtClean="0"/>
-              <a:t>1/4/2021</a:t>
+              <a:t>1/5/2021</a:t>
             </a:fld>
             <a:endParaRPr lang="en-US" dirty="0"/>
           </a:p>
@@ -973,7 +981,7 @@
           <a:p>
             <a:fld id="{4BE1D723-8F53-4F53-90B0-1982A396982E}" type="datetime1">
               <a:rPr lang="en-US" smtClean="0"/>
-              <a:t>1/4/2021</a:t>
+              <a:t>1/5/2021</a:t>
             </a:fld>
             <a:endParaRPr lang="en-US" dirty="0"/>
           </a:p>
@@ -1346,7 +1354,7 @@
           <a:p>
             <a:fld id="{97669AF7-7BEB-44E4-9852-375E34362B5B}" type="datetime1">
               <a:rPr lang="en-US" smtClean="0"/>
-              <a:t>1/4/2021</a:t>
+              <a:t>1/5/2021</a:t>
             </a:fld>
             <a:endParaRPr lang="en-US" dirty="0"/>
           </a:p>
@@ -1601,7 +1609,7 @@
           <a:p>
             <a:fld id="{BAAAC38D-0552-4C82-B593-E6124DFADBE2}" type="datetime1">
               <a:rPr lang="en-US" smtClean="0"/>
-              <a:t>1/4/2021</a:t>
+              <a:t>1/5/2021</a:t>
             </a:fld>
             <a:endParaRPr lang="en-US" dirty="0"/>
           </a:p>
@@ -1998,7 +2006,7 @@
           <a:p>
             <a:fld id="{D9DF0F1C-5577-4ACB-BB62-DF8F3C494C7E}" type="datetime1">
               <a:rPr lang="en-US" smtClean="0"/>
-              <a:t>1/4/2021</a:t>
+              <a:t>1/5/2021</a:t>
             </a:fld>
             <a:endParaRPr lang="en-US" dirty="0"/>
           </a:p>
@@ -2134,7 +2142,7 @@
           <a:p>
             <a:fld id="{1775B394-D9F9-4F0C-B15D-605F45CB9E9F}" type="datetime1">
               <a:rPr lang="en-US" smtClean="0"/>
-              <a:t>1/4/2021</a:t>
+              <a:t>1/5/2021</a:t>
             </a:fld>
             <a:endParaRPr lang="en-US" dirty="0"/>
           </a:p>
@@ -2291,7 +2299,7 @@
           <a:p>
             <a:fld id="{39667345-2558-425A-8533-9BFDBCE15005}" type="datetime1">
               <a:rPr lang="en-US" smtClean="0"/>
-              <a:t>1/4/2021</a:t>
+              <a:t>1/5/2021</a:t>
             </a:fld>
             <a:endParaRPr lang="en-US" dirty="0"/>
           </a:p>
@@ -2620,7 +2628,7 @@
           <a:p>
             <a:fld id="{92BEA474-078D-4E9B-9B14-09A87B19DC46}" type="datetime1">
               <a:rPr lang="en-US" smtClean="0"/>
-              <a:t>1/4/2021</a:t>
+              <a:t>1/5/2021</a:t>
             </a:fld>
             <a:endParaRPr lang="en-US" dirty="0"/>
           </a:p>
@@ -2970,7 +2978,7 @@
           <a:p>
             <a:fld id="{4907D986-8816-4272-A432-0437A28A9828}" type="datetime1">
               <a:rPr lang="en-US" smtClean="0"/>
-              <a:t>1/4/2021</a:t>
+              <a:t>1/5/2021</a:t>
             </a:fld>
             <a:endParaRPr lang="en-US" dirty="0"/>
           </a:p>
@@ -3231,7 +3239,7 @@
           <a:p>
             <a:fld id="{62D6E202-B606-4609-B914-27C9371A1F6D}" type="datetime1">
               <a:rPr lang="en-US" smtClean="0"/>
-              <a:t>1/4/2021</a:t>
+              <a:t>1/5/2021</a:t>
             </a:fld>
             <a:endParaRPr lang="en-US" dirty="0"/>
           </a:p>
@@ -4942,7 +4950,7 @@
               <a:rPr lang="fr-FR" sz="2000" dirty="0">
                 <a:latin typeface="Montserrat" panose="00000500000000000000" pitchFamily="2" charset="0"/>
               </a:rPr>
-              <a:t>Recherche de commerçants </a:t>
+              <a:t>Liste des commerçants parisiens </a:t>
             </a:r>
           </a:p>
           <a:p>
@@ -4957,7 +4965,7 @@
               <a:rPr lang="fr-FR" sz="2000" dirty="0">
                 <a:latin typeface="Montserrat" panose="00000500000000000000" pitchFamily="2" charset="0"/>
               </a:rPr>
-              <a:t>Liste des commerçants parisiens </a:t>
+              <a:t>Détails des informations d’un commerçant </a:t>
             </a:r>
           </a:p>
           <a:p>
@@ -4972,7 +4980,19 @@
               <a:rPr lang="fr-FR" sz="2000" dirty="0">
                 <a:latin typeface="Montserrat" panose="00000500000000000000" pitchFamily="2" charset="0"/>
               </a:rPr>
-              <a:t>Détails des informations d’un commerçant </a:t>
+              <a:t>Affichage de la position du commerçant via </a:t>
+            </a:r>
+            <a:r>
+              <a:rPr lang="fr-FR" sz="2000" dirty="0" err="1">
+                <a:latin typeface="Montserrat" panose="00000500000000000000" pitchFamily="2" charset="0"/>
+              </a:rPr>
+              <a:t>GoogleMaps</a:t>
+            </a:r>
+            <a:r>
+              <a:rPr lang="fr-FR" sz="2000" dirty="0">
+                <a:latin typeface="Montserrat" panose="00000500000000000000" pitchFamily="2" charset="0"/>
+              </a:rPr>
+              <a:t> </a:t>
             </a:r>
           </a:p>
           <a:p>
@@ -4987,7 +5007,7 @@
               <a:rPr lang="fr-FR" sz="2000" dirty="0">
                 <a:latin typeface="Montserrat" panose="00000500000000000000" pitchFamily="2" charset="0"/>
               </a:rPr>
-              <a:t>Itinéraire entre une position et le commerçant (A préciser)</a:t>
+              <a:t>Ajout et suppression de commerçants en favoris</a:t>
             </a:r>
           </a:p>
           <a:p>
@@ -5002,7 +5022,7 @@
               <a:rPr lang="fr-FR" sz="2000" dirty="0">
                 <a:latin typeface="Montserrat" panose="00000500000000000000" pitchFamily="2" charset="0"/>
               </a:rPr>
-              <a:t>Ajout de commerçants en favoris</a:t>
+              <a:t>Trie par type de commerçant </a:t>
             </a:r>
           </a:p>
         </p:txBody>
@@ -5011,6 +5031,1019 @@
     <p:extLst>
       <p:ext uri="{BB962C8B-B14F-4D97-AF65-F5344CB8AC3E}">
         <p14:creationId xmlns:p14="http://schemas.microsoft.com/office/powerpoint/2010/main" val="2517217999"/>
+      </p:ext>
+    </p:extLst>
+  </p:cSld>
+  <p:clrMapOvr>
+    <a:masterClrMapping/>
+  </p:clrMapOvr>
+</p:sld>
+</file>
+
+<file path=ppt/slides/slide6.xml><?xml version="1.0" encoding="utf-8"?>
+<p:sld xmlns:a="http://schemas.openxmlformats.org/drawingml/2006/main" xmlns:r="http://schemas.openxmlformats.org/officeDocument/2006/relationships" xmlns:p="http://schemas.openxmlformats.org/presentationml/2006/main">
+  <p:cSld>
+    <p:spTree>
+      <p:nvGrpSpPr>
+        <p:cNvPr id="1" name=""/>
+        <p:cNvGrpSpPr/>
+        <p:nvPr/>
+      </p:nvGrpSpPr>
+      <p:grpSpPr>
+        <a:xfrm>
+          <a:off x="0" y="0"/>
+          <a:ext cx="0" cy="0"/>
+          <a:chOff x="0" y="0"/>
+          <a:chExt cx="0" cy="0"/>
+        </a:xfrm>
+      </p:grpSpPr>
+      <p:sp>
+        <p:nvSpPr>
+          <p:cNvPr id="6" name="Titre 5">
+            <a:extLst>
+              <a:ext uri="{FF2B5EF4-FFF2-40B4-BE49-F238E27FC236}">
+                <a16:creationId xmlns:a16="http://schemas.microsoft.com/office/drawing/2014/main" id="{F00BF0C0-A418-4385-82BA-CC3E943E3840}"/>
+              </a:ext>
+            </a:extLst>
+          </p:cNvPr>
+          <p:cNvSpPr>
+            <a:spLocks noGrp="1"/>
+          </p:cNvSpPr>
+          <p:nvPr>
+            <p:ph type="title"/>
+          </p:nvPr>
+        </p:nvSpPr>
+        <p:spPr/>
+        <p:txBody>
+          <a:bodyPr>
+            <a:normAutofit fontScale="90000"/>
+          </a:bodyPr>
+          <a:lstStyle/>
+          <a:p>
+            <a:r>
+              <a:rPr lang="fr-FR" dirty="0">
+                <a:latin typeface="Montserrat Medium" panose="00000600000000000000" pitchFamily="2" charset="0"/>
+              </a:rPr>
+              <a:t>Architecture de l’application</a:t>
+            </a:r>
+          </a:p>
+        </p:txBody>
+      </p:sp>
+      <p:pic>
+        <p:nvPicPr>
+          <p:cNvPr id="11" name="Image 10">
+            <a:extLst>
+              <a:ext uri="{FF2B5EF4-FFF2-40B4-BE49-F238E27FC236}">
+                <a16:creationId xmlns:a16="http://schemas.microsoft.com/office/drawing/2014/main" id="{6B1F0C0E-4196-4E6C-8968-39F31BD15E0D}"/>
+              </a:ext>
+            </a:extLst>
+          </p:cNvPr>
+          <p:cNvPicPr>
+            <a:picLocks noChangeAspect="1"/>
+          </p:cNvPicPr>
+          <p:nvPr/>
+        </p:nvPicPr>
+        <p:blipFill>
+          <a:blip r:embed="rId2"/>
+          <a:stretch>
+            <a:fillRect/>
+          </a:stretch>
+        </p:blipFill>
+        <p:spPr>
+          <a:xfrm>
+            <a:off x="1719262" y="1989326"/>
+            <a:ext cx="8753475" cy="4295775"/>
+          </a:xfrm>
+          <a:prstGeom prst="rect">
+            <a:avLst/>
+          </a:prstGeom>
+        </p:spPr>
+      </p:pic>
+    </p:spTree>
+    <p:extLst>
+      <p:ext uri="{BB962C8B-B14F-4D97-AF65-F5344CB8AC3E}">
+        <p14:creationId xmlns:p14="http://schemas.microsoft.com/office/powerpoint/2010/main" val="3312951430"/>
+      </p:ext>
+    </p:extLst>
+  </p:cSld>
+  <p:clrMapOvr>
+    <a:masterClrMapping/>
+  </p:clrMapOvr>
+</p:sld>
+</file>
+
+<file path=ppt/slides/slide7.xml><?xml version="1.0" encoding="utf-8"?>
+<p:sld xmlns:a="http://schemas.openxmlformats.org/drawingml/2006/main" xmlns:r="http://schemas.openxmlformats.org/officeDocument/2006/relationships" xmlns:p="http://schemas.openxmlformats.org/presentationml/2006/main">
+  <p:cSld>
+    <p:spTree>
+      <p:nvGrpSpPr>
+        <p:cNvPr id="1" name=""/>
+        <p:cNvGrpSpPr/>
+        <p:nvPr/>
+      </p:nvGrpSpPr>
+      <p:grpSpPr>
+        <a:xfrm>
+          <a:off x="0" y="0"/>
+          <a:ext cx="0" cy="0"/>
+          <a:chOff x="0" y="0"/>
+          <a:chExt cx="0" cy="0"/>
+        </a:xfrm>
+      </p:grpSpPr>
+      <p:sp>
+        <p:nvSpPr>
+          <p:cNvPr id="6" name="Titre 5">
+            <a:extLst>
+              <a:ext uri="{FF2B5EF4-FFF2-40B4-BE49-F238E27FC236}">
+                <a16:creationId xmlns:a16="http://schemas.microsoft.com/office/drawing/2014/main" id="{F00BF0C0-A418-4385-82BA-CC3E943E3840}"/>
+              </a:ext>
+            </a:extLst>
+          </p:cNvPr>
+          <p:cNvSpPr>
+            <a:spLocks noGrp="1"/>
+          </p:cNvSpPr>
+          <p:nvPr>
+            <p:ph type="title"/>
+          </p:nvPr>
+        </p:nvSpPr>
+        <p:spPr/>
+        <p:txBody>
+          <a:bodyPr/>
+          <a:lstStyle/>
+          <a:p>
+            <a:r>
+              <a:rPr lang="fr-FR" dirty="0">
+                <a:latin typeface="Montserrat Medium" panose="00000600000000000000" pitchFamily="2" charset="0"/>
+              </a:rPr>
+              <a:t>Design de l’application </a:t>
+            </a:r>
+          </a:p>
+        </p:txBody>
+      </p:sp>
+      <p:pic>
+        <p:nvPicPr>
+          <p:cNvPr id="1026" name="Picture 2">
+            <a:extLst>
+              <a:ext uri="{FF2B5EF4-FFF2-40B4-BE49-F238E27FC236}">
+                <a16:creationId xmlns:a16="http://schemas.microsoft.com/office/drawing/2014/main" id="{FD7A9549-B6ED-487E-8338-D874AA079089}"/>
+              </a:ext>
+            </a:extLst>
+          </p:cNvPr>
+          <p:cNvPicPr>
+            <a:picLocks noChangeAspect="1" noChangeArrowheads="1"/>
+          </p:cNvPicPr>
+          <p:nvPr/>
+        </p:nvPicPr>
+        <p:blipFill>
+          <a:blip r:embed="rId2">
+            <a:extLst>
+              <a:ext uri="{28A0092B-C50C-407E-A947-70E740481C1C}">
+                <a14:useLocalDpi xmlns:a14="http://schemas.microsoft.com/office/drawing/2010/main" val="0"/>
+              </a:ext>
+            </a:extLst>
+          </a:blip>
+          <a:srcRect/>
+          <a:stretch>
+            <a:fillRect/>
+          </a:stretch>
+        </p:blipFill>
+        <p:spPr bwMode="auto">
+          <a:xfrm>
+            <a:off x="1359826" y="2101123"/>
+            <a:ext cx="1869656" cy="3970062"/>
+          </a:xfrm>
+          <a:prstGeom prst="rect">
+            <a:avLst/>
+          </a:prstGeom>
+          <a:noFill/>
+          <a:extLst>
+            <a:ext uri="{909E8E84-426E-40DD-AFC4-6F175D3DCCD1}">
+              <a14:hiddenFill xmlns:a14="http://schemas.microsoft.com/office/drawing/2010/main">
+                <a:solidFill>
+                  <a:srgbClr val="FFFFFF"/>
+                </a:solidFill>
+              </a14:hiddenFill>
+            </a:ext>
+          </a:extLst>
+        </p:spPr>
+      </p:pic>
+      <p:pic>
+        <p:nvPicPr>
+          <p:cNvPr id="1028" name="Picture 4">
+            <a:extLst>
+              <a:ext uri="{FF2B5EF4-FFF2-40B4-BE49-F238E27FC236}">
+                <a16:creationId xmlns:a16="http://schemas.microsoft.com/office/drawing/2014/main" id="{4D8B4EB7-0AB7-4B0F-AA04-3BA6C0990A74}"/>
+              </a:ext>
+            </a:extLst>
+          </p:cNvPr>
+          <p:cNvPicPr>
+            <a:picLocks noChangeAspect="1" noChangeArrowheads="1"/>
+          </p:cNvPicPr>
+          <p:nvPr/>
+        </p:nvPicPr>
+        <p:blipFill>
+          <a:blip r:embed="rId3">
+            <a:extLst>
+              <a:ext uri="{28A0092B-C50C-407E-A947-70E740481C1C}">
+                <a14:useLocalDpi xmlns:a14="http://schemas.microsoft.com/office/drawing/2010/main" val="0"/>
+              </a:ext>
+            </a:extLst>
+          </a:blip>
+          <a:srcRect/>
+          <a:stretch>
+            <a:fillRect/>
+          </a:stretch>
+        </p:blipFill>
+        <p:spPr bwMode="auto">
+          <a:xfrm>
+            <a:off x="4043303" y="2101123"/>
+            <a:ext cx="1869656" cy="3970062"/>
+          </a:xfrm>
+          <a:prstGeom prst="rect">
+            <a:avLst/>
+          </a:prstGeom>
+          <a:noFill/>
+          <a:extLst>
+            <a:ext uri="{909E8E84-426E-40DD-AFC4-6F175D3DCCD1}">
+              <a14:hiddenFill xmlns:a14="http://schemas.microsoft.com/office/drawing/2010/main">
+                <a:solidFill>
+                  <a:srgbClr val="FFFFFF"/>
+                </a:solidFill>
+              </a14:hiddenFill>
+            </a:ext>
+          </a:extLst>
+        </p:spPr>
+      </p:pic>
+      <p:sp>
+        <p:nvSpPr>
+          <p:cNvPr id="4" name="Flèche : droite 3">
+            <a:extLst>
+              <a:ext uri="{FF2B5EF4-FFF2-40B4-BE49-F238E27FC236}">
+                <a16:creationId xmlns:a16="http://schemas.microsoft.com/office/drawing/2014/main" id="{DAE4A1B6-CBC5-47B5-8475-9077D1D52106}"/>
+              </a:ext>
+            </a:extLst>
+          </p:cNvPr>
+          <p:cNvSpPr/>
+          <p:nvPr/>
+        </p:nvSpPr>
+        <p:spPr>
+          <a:xfrm>
+            <a:off x="3290747" y="3898142"/>
+            <a:ext cx="714628" cy="376023"/>
+          </a:xfrm>
+          <a:prstGeom prst="rightArrow">
+            <a:avLst/>
+          </a:prstGeom>
+        </p:spPr>
+        <p:style>
+          <a:lnRef idx="2">
+            <a:schemeClr val="accent1">
+              <a:shade val="50000"/>
+            </a:schemeClr>
+          </a:lnRef>
+          <a:fillRef idx="1">
+            <a:schemeClr val="accent1"/>
+          </a:fillRef>
+          <a:effectRef idx="0">
+            <a:schemeClr val="accent1"/>
+          </a:effectRef>
+          <a:fontRef idx="minor">
+            <a:schemeClr val="lt1"/>
+          </a:fontRef>
+        </p:style>
+        <p:txBody>
+          <a:bodyPr rtlCol="0" anchor="ctr"/>
+          <a:lstStyle/>
+          <a:p>
+            <a:pPr algn="ctr"/>
+            <a:endParaRPr lang="fr-FR"/>
+          </a:p>
+        </p:txBody>
+      </p:sp>
+      <p:pic>
+        <p:nvPicPr>
+          <p:cNvPr id="1030" name="Picture 6">
+            <a:extLst>
+              <a:ext uri="{FF2B5EF4-FFF2-40B4-BE49-F238E27FC236}">
+                <a16:creationId xmlns:a16="http://schemas.microsoft.com/office/drawing/2014/main" id="{DF98FBFB-C6FD-4AC9-96D1-9E3EB0164DCF}"/>
+              </a:ext>
+            </a:extLst>
+          </p:cNvPr>
+          <p:cNvPicPr>
+            <a:picLocks noChangeAspect="1" noChangeArrowheads="1"/>
+          </p:cNvPicPr>
+          <p:nvPr/>
+        </p:nvPicPr>
+        <p:blipFill>
+          <a:blip r:embed="rId4">
+            <a:extLst>
+              <a:ext uri="{28A0092B-C50C-407E-A947-70E740481C1C}">
+                <a14:useLocalDpi xmlns:a14="http://schemas.microsoft.com/office/drawing/2010/main" val="0"/>
+              </a:ext>
+            </a:extLst>
+          </a:blip>
+          <a:srcRect/>
+          <a:stretch>
+            <a:fillRect/>
+          </a:stretch>
+        </p:blipFill>
+        <p:spPr bwMode="auto">
+          <a:xfrm>
+            <a:off x="6726780" y="2101123"/>
+            <a:ext cx="1869656" cy="3970062"/>
+          </a:xfrm>
+          <a:prstGeom prst="rect">
+            <a:avLst/>
+          </a:prstGeom>
+          <a:noFill/>
+          <a:extLst>
+            <a:ext uri="{909E8E84-426E-40DD-AFC4-6F175D3DCCD1}">
+              <a14:hiddenFill xmlns:a14="http://schemas.microsoft.com/office/drawing/2010/main">
+                <a:solidFill>
+                  <a:srgbClr val="FFFFFF"/>
+                </a:solidFill>
+              </a14:hiddenFill>
+            </a:ext>
+          </a:extLst>
+        </p:spPr>
+      </p:pic>
+      <p:sp>
+        <p:nvSpPr>
+          <p:cNvPr id="10" name="Flèche : droite 9">
+            <a:extLst>
+              <a:ext uri="{FF2B5EF4-FFF2-40B4-BE49-F238E27FC236}">
+                <a16:creationId xmlns:a16="http://schemas.microsoft.com/office/drawing/2014/main" id="{729D41C1-2B24-4168-8ADC-6DC1A736FAE7}"/>
+              </a:ext>
+            </a:extLst>
+          </p:cNvPr>
+          <p:cNvSpPr/>
+          <p:nvPr/>
+        </p:nvSpPr>
+        <p:spPr>
+          <a:xfrm>
+            <a:off x="5964530" y="3903006"/>
+            <a:ext cx="714628" cy="376023"/>
+          </a:xfrm>
+          <a:prstGeom prst="rightArrow">
+            <a:avLst/>
+          </a:prstGeom>
+        </p:spPr>
+        <p:style>
+          <a:lnRef idx="2">
+            <a:schemeClr val="accent1">
+              <a:shade val="50000"/>
+            </a:schemeClr>
+          </a:lnRef>
+          <a:fillRef idx="1">
+            <a:schemeClr val="accent1"/>
+          </a:fillRef>
+          <a:effectRef idx="0">
+            <a:schemeClr val="accent1"/>
+          </a:effectRef>
+          <a:fontRef idx="minor">
+            <a:schemeClr val="lt1"/>
+          </a:fontRef>
+        </p:style>
+        <p:txBody>
+          <a:bodyPr rtlCol="0" anchor="ctr"/>
+          <a:lstStyle/>
+          <a:p>
+            <a:pPr algn="ctr"/>
+            <a:endParaRPr lang="fr-FR"/>
+          </a:p>
+        </p:txBody>
+      </p:sp>
+      <p:pic>
+        <p:nvPicPr>
+          <p:cNvPr id="1032" name="Picture 8">
+            <a:extLst>
+              <a:ext uri="{FF2B5EF4-FFF2-40B4-BE49-F238E27FC236}">
+                <a16:creationId xmlns:a16="http://schemas.microsoft.com/office/drawing/2014/main" id="{2BE6E284-C876-45F5-8D67-80CF85C21DFC}"/>
+              </a:ext>
+            </a:extLst>
+          </p:cNvPr>
+          <p:cNvPicPr>
+            <a:picLocks noChangeAspect="1" noChangeArrowheads="1"/>
+          </p:cNvPicPr>
+          <p:nvPr/>
+        </p:nvPicPr>
+        <p:blipFill>
+          <a:blip r:embed="rId5">
+            <a:extLst>
+              <a:ext uri="{28A0092B-C50C-407E-A947-70E740481C1C}">
+                <a14:useLocalDpi xmlns:a14="http://schemas.microsoft.com/office/drawing/2010/main" val="0"/>
+              </a:ext>
+            </a:extLst>
+          </a:blip>
+          <a:srcRect/>
+          <a:stretch>
+            <a:fillRect/>
+          </a:stretch>
+        </p:blipFill>
+        <p:spPr bwMode="auto">
+          <a:xfrm>
+            <a:off x="9406308" y="2101123"/>
+            <a:ext cx="1869656" cy="3970062"/>
+          </a:xfrm>
+          <a:prstGeom prst="rect">
+            <a:avLst/>
+          </a:prstGeom>
+          <a:noFill/>
+          <a:extLst>
+            <a:ext uri="{909E8E84-426E-40DD-AFC4-6F175D3DCCD1}">
+              <a14:hiddenFill xmlns:a14="http://schemas.microsoft.com/office/drawing/2010/main">
+                <a:solidFill>
+                  <a:srgbClr val="FFFFFF"/>
+                </a:solidFill>
+              </a14:hiddenFill>
+            </a:ext>
+          </a:extLst>
+        </p:spPr>
+      </p:pic>
+      <p:sp>
+        <p:nvSpPr>
+          <p:cNvPr id="12" name="Flèche : droite 11">
+            <a:extLst>
+              <a:ext uri="{FF2B5EF4-FFF2-40B4-BE49-F238E27FC236}">
+                <a16:creationId xmlns:a16="http://schemas.microsoft.com/office/drawing/2014/main" id="{C45B0BEB-BB7B-4882-A34C-786E03C6D108}"/>
+              </a:ext>
+            </a:extLst>
+          </p:cNvPr>
+          <p:cNvSpPr/>
+          <p:nvPr/>
+        </p:nvSpPr>
+        <p:spPr>
+          <a:xfrm>
+            <a:off x="8644058" y="3898141"/>
+            <a:ext cx="714628" cy="376023"/>
+          </a:xfrm>
+          <a:prstGeom prst="rightArrow">
+            <a:avLst/>
+          </a:prstGeom>
+        </p:spPr>
+        <p:style>
+          <a:lnRef idx="2">
+            <a:schemeClr val="accent1">
+              <a:shade val="50000"/>
+            </a:schemeClr>
+          </a:lnRef>
+          <a:fillRef idx="1">
+            <a:schemeClr val="accent1"/>
+          </a:fillRef>
+          <a:effectRef idx="0">
+            <a:schemeClr val="accent1"/>
+          </a:effectRef>
+          <a:fontRef idx="minor">
+            <a:schemeClr val="lt1"/>
+          </a:fontRef>
+        </p:style>
+        <p:txBody>
+          <a:bodyPr rtlCol="0" anchor="ctr"/>
+          <a:lstStyle/>
+          <a:p>
+            <a:pPr algn="ctr"/>
+            <a:endParaRPr lang="fr-FR"/>
+          </a:p>
+        </p:txBody>
+      </p:sp>
+    </p:spTree>
+    <p:extLst>
+      <p:ext uri="{BB962C8B-B14F-4D97-AF65-F5344CB8AC3E}">
+        <p14:creationId xmlns:p14="http://schemas.microsoft.com/office/powerpoint/2010/main" val="939895561"/>
+      </p:ext>
+    </p:extLst>
+  </p:cSld>
+  <p:clrMapOvr>
+    <a:masterClrMapping/>
+  </p:clrMapOvr>
+</p:sld>
+</file>
+
+<file path=ppt/slides/slide8.xml><?xml version="1.0" encoding="utf-8"?>
+<p:sld xmlns:a="http://schemas.openxmlformats.org/drawingml/2006/main" xmlns:r="http://schemas.openxmlformats.org/officeDocument/2006/relationships" xmlns:p="http://schemas.openxmlformats.org/presentationml/2006/main">
+  <p:cSld>
+    <p:bg>
+      <p:bgPr>
+        <a:solidFill>
+          <a:schemeClr val="bg1"/>
+        </a:solidFill>
+        <a:effectLst/>
+      </p:bgPr>
+    </p:bg>
+    <p:spTree>
+      <p:nvGrpSpPr>
+        <p:cNvPr id="1" name=""/>
+        <p:cNvGrpSpPr/>
+        <p:nvPr/>
+      </p:nvGrpSpPr>
+      <p:grpSpPr>
+        <a:xfrm>
+          <a:off x="0" y="0"/>
+          <a:ext cx="0" cy="0"/>
+          <a:chOff x="0" y="0"/>
+          <a:chExt cx="0" cy="0"/>
+        </a:xfrm>
+      </p:grpSpPr>
+      <p:sp>
+        <p:nvSpPr>
+          <p:cNvPr id="73" name="Rectangle 72">
+            <a:extLst>
+              <a:ext uri="{FF2B5EF4-FFF2-40B4-BE49-F238E27FC236}">
+                <a16:creationId xmlns:a16="http://schemas.microsoft.com/office/drawing/2014/main" id="{39E3965E-AC41-4711-9D10-E25ABB132D86}"/>
+              </a:ext>
+              <a:ext uri="{C183D7F6-B498-43B3-948B-1728B52AA6E4}">
+                <adec:decorative xmlns:adec="http://schemas.microsoft.com/office/drawing/2017/decorative" val="1"/>
+              </a:ext>
+            </a:extLst>
+          </p:cNvPr>
+          <p:cNvSpPr>
+            <a:spLocks noGrp="1" noRot="1" noChangeAspect="1" noMove="1" noResize="1" noEditPoints="1" noAdjustHandles="1" noChangeArrowheads="1" noChangeShapeType="1" noTextEdit="1"/>
+          </p:cNvSpPr>
+          <p:nvPr>
+            <p:extLst>
+              <p:ext uri="{386F3935-93C4-4BCD-93E2-E3B085C9AB24}">
+                <p16:designElem xmlns:p16="http://schemas.microsoft.com/office/powerpoint/2015/main" val="1"/>
+              </p:ext>
+            </p:extLst>
+          </p:nvPr>
+        </p:nvSpPr>
+        <p:spPr>
+          <a:xfrm>
+            <a:off x="3175" y="6400800"/>
+            <a:ext cx="12188825" cy="457200"/>
+          </a:xfrm>
+          <a:prstGeom prst="rect">
+            <a:avLst/>
+          </a:prstGeom>
+          <a:solidFill>
+            <a:srgbClr val="262626"/>
+          </a:solidFill>
+          <a:ln>
+            <a:noFill/>
+          </a:ln>
+        </p:spPr>
+        <p:style>
+          <a:lnRef idx="2">
+            <a:schemeClr val="accent1">
+              <a:shade val="50000"/>
+            </a:schemeClr>
+          </a:lnRef>
+          <a:fillRef idx="1">
+            <a:schemeClr val="accent1"/>
+          </a:fillRef>
+          <a:effectRef idx="0">
+            <a:schemeClr val="accent1"/>
+          </a:effectRef>
+          <a:fontRef idx="minor">
+            <a:schemeClr val="lt1"/>
+          </a:fontRef>
+        </p:style>
+      </p:sp>
+      <p:cxnSp>
+        <p:nvCxnSpPr>
+          <p:cNvPr id="75" name="Straight Connector 74">
+            <a:extLst>
+              <a:ext uri="{FF2B5EF4-FFF2-40B4-BE49-F238E27FC236}">
+                <a16:creationId xmlns:a16="http://schemas.microsoft.com/office/drawing/2014/main" id="{1F5DC8C3-BA5F-4EED-BB9A-A14272BD82A1}"/>
+              </a:ext>
+              <a:ext uri="{C183D7F6-B498-43B3-948B-1728B52AA6E4}">
+                <adec:decorative xmlns:adec="http://schemas.microsoft.com/office/drawing/2017/decorative" val="1"/>
+              </a:ext>
+            </a:extLst>
+          </p:cNvPr>
+          <p:cNvCxnSpPr>
+            <a:cxnSpLocks noGrp="1" noRot="1" noChangeAspect="1" noMove="1" noResize="1" noEditPoints="1" noAdjustHandles="1" noChangeArrowheads="1" noChangeShapeType="1"/>
+          </p:cNvCxnSpPr>
+          <p:nvPr>
+            <p:extLst>
+              <p:ext uri="{386F3935-93C4-4BCD-93E2-E3B085C9AB24}">
+                <p16:designElem xmlns:p16="http://schemas.microsoft.com/office/powerpoint/2015/main" val="1"/>
+              </p:ext>
+            </p:extLst>
+          </p:nvPr>
+        </p:nvCxnSpPr>
+        <p:spPr>
+          <a:xfrm>
+            <a:off x="1207658" y="4474741"/>
+            <a:ext cx="9875520" cy="0"/>
+          </a:xfrm>
+          <a:prstGeom prst="line">
+            <a:avLst/>
+          </a:prstGeom>
+          <a:ln w="12700">
+            <a:solidFill>
+              <a:schemeClr val="tx1">
+                <a:lumMod val="75000"/>
+                <a:lumOff val="25000"/>
+              </a:schemeClr>
+            </a:solidFill>
+          </a:ln>
+        </p:spPr>
+        <p:style>
+          <a:lnRef idx="1">
+            <a:schemeClr val="accent1"/>
+          </a:lnRef>
+          <a:fillRef idx="0">
+            <a:schemeClr val="accent1"/>
+          </a:fillRef>
+          <a:effectRef idx="0">
+            <a:schemeClr val="accent1"/>
+          </a:effectRef>
+          <a:fontRef idx="minor">
+            <a:schemeClr val="tx1"/>
+          </a:fontRef>
+        </p:style>
+      </p:cxnSp>
+      <p:sp>
+        <p:nvSpPr>
+          <p:cNvPr id="77" name="Rectangle 76">
+            <a:extLst>
+              <a:ext uri="{FF2B5EF4-FFF2-40B4-BE49-F238E27FC236}">
+                <a16:creationId xmlns:a16="http://schemas.microsoft.com/office/drawing/2014/main" id="{2FDF0794-1B86-42B2-B8C7-F60123E638ED}"/>
+              </a:ext>
+              <a:ext uri="{C183D7F6-B498-43B3-948B-1728B52AA6E4}">
+                <adec:decorative xmlns:adec="http://schemas.microsoft.com/office/drawing/2017/decorative" val="1"/>
+              </a:ext>
+            </a:extLst>
+          </p:cNvPr>
+          <p:cNvSpPr>
+            <a:spLocks noGrp="1" noRot="1" noChangeAspect="1" noMove="1" noResize="1" noEditPoints="1" noAdjustHandles="1" noChangeArrowheads="1" noChangeShapeType="1" noTextEdit="1"/>
+          </p:cNvSpPr>
+          <p:nvPr>
+            <p:extLst>
+              <p:ext uri="{386F3935-93C4-4BCD-93E2-E3B085C9AB24}">
+                <p16:designElem xmlns:p16="http://schemas.microsoft.com/office/powerpoint/2015/main" val="1"/>
+              </p:ext>
+            </p:extLst>
+          </p:nvPr>
+        </p:nvSpPr>
+        <p:spPr>
+          <a:xfrm>
+            <a:off x="3274" y="0"/>
+            <a:ext cx="12188726" cy="6858975"/>
+          </a:xfrm>
+          <a:prstGeom prst="rect">
+            <a:avLst/>
+          </a:prstGeom>
+          <a:solidFill>
+            <a:schemeClr val="bg1"/>
+          </a:solidFill>
+          <a:ln>
+            <a:noFill/>
+          </a:ln>
+        </p:spPr>
+        <p:style>
+          <a:lnRef idx="2">
+            <a:schemeClr val="accent1">
+              <a:shade val="50000"/>
+            </a:schemeClr>
+          </a:lnRef>
+          <a:fillRef idx="1">
+            <a:schemeClr val="accent1"/>
+          </a:fillRef>
+          <a:effectRef idx="0">
+            <a:schemeClr val="accent1"/>
+          </a:effectRef>
+          <a:fontRef idx="minor">
+            <a:schemeClr val="lt1"/>
+          </a:fontRef>
+        </p:style>
+        <p:txBody>
+          <a:bodyPr rtlCol="0" anchor="ctr"/>
+          <a:lstStyle/>
+          <a:p>
+            <a:pPr algn="ctr"/>
+            <a:endParaRPr lang="en-US"/>
+          </a:p>
+        </p:txBody>
+      </p:sp>
+      <p:sp>
+        <p:nvSpPr>
+          <p:cNvPr id="79" name="Rectangle 78">
+            <a:extLst>
+              <a:ext uri="{FF2B5EF4-FFF2-40B4-BE49-F238E27FC236}">
+                <a16:creationId xmlns:a16="http://schemas.microsoft.com/office/drawing/2014/main" id="{C5373426-E26E-431D-959C-5DB96C0B6208}"/>
+              </a:ext>
+              <a:ext uri="{C183D7F6-B498-43B3-948B-1728B52AA6E4}">
+                <adec:decorative xmlns:adec="http://schemas.microsoft.com/office/drawing/2017/decorative" val="1"/>
+              </a:ext>
+            </a:extLst>
+          </p:cNvPr>
+          <p:cNvSpPr>
+            <a:spLocks noGrp="1" noRot="1" noChangeAspect="1" noMove="1" noResize="1" noEditPoints="1" noAdjustHandles="1" noChangeArrowheads="1" noChangeShapeType="1" noTextEdit="1"/>
+          </p:cNvSpPr>
+          <p:nvPr>
+            <p:extLst>
+              <p:ext uri="{386F3935-93C4-4BCD-93E2-E3B085C9AB24}">
+                <p16:designElem xmlns:p16="http://schemas.microsoft.com/office/powerpoint/2015/main" val="1"/>
+              </p:ext>
+            </p:extLst>
+          </p:nvPr>
+        </p:nvSpPr>
+        <p:spPr>
+          <a:xfrm>
+            <a:off x="643467" y="1238442"/>
+            <a:ext cx="3635926" cy="4355751"/>
+          </a:xfrm>
+          <a:prstGeom prst="rect">
+            <a:avLst/>
+          </a:prstGeom>
+          <a:solidFill>
+            <a:schemeClr val="tx1">
+              <a:alpha val="85000"/>
+            </a:schemeClr>
+          </a:solidFill>
+          <a:ln>
+            <a:noFill/>
+          </a:ln>
+        </p:spPr>
+        <p:style>
+          <a:lnRef idx="2">
+            <a:schemeClr val="accent1">
+              <a:shade val="50000"/>
+            </a:schemeClr>
+          </a:lnRef>
+          <a:fillRef idx="1">
+            <a:schemeClr val="accent1"/>
+          </a:fillRef>
+          <a:effectRef idx="0">
+            <a:schemeClr val="accent1"/>
+          </a:effectRef>
+          <a:fontRef idx="minor">
+            <a:schemeClr val="lt1"/>
+          </a:fontRef>
+        </p:style>
+        <p:txBody>
+          <a:bodyPr rtlCol="0" anchor="ctr"/>
+          <a:lstStyle/>
+          <a:p>
+            <a:pPr algn="ctr"/>
+            <a:endParaRPr lang="en-US"/>
+          </a:p>
+        </p:txBody>
+      </p:sp>
+      <p:sp>
+        <p:nvSpPr>
+          <p:cNvPr id="6" name="Titre 5">
+            <a:extLst>
+              <a:ext uri="{FF2B5EF4-FFF2-40B4-BE49-F238E27FC236}">
+                <a16:creationId xmlns:a16="http://schemas.microsoft.com/office/drawing/2014/main" id="{F00BF0C0-A418-4385-82BA-CC3E943E3840}"/>
+              </a:ext>
+            </a:extLst>
+          </p:cNvPr>
+          <p:cNvSpPr>
+            <a:spLocks noGrp="1"/>
+          </p:cNvSpPr>
+          <p:nvPr>
+            <p:ph type="title"/>
+          </p:nvPr>
+        </p:nvSpPr>
+        <p:spPr>
+          <a:xfrm>
+            <a:off x="643466" y="1475234"/>
+            <a:ext cx="3558883" cy="2901694"/>
+          </a:xfrm>
+        </p:spPr>
+        <p:txBody>
+          <a:bodyPr vert="horz" lIns="91440" tIns="45720" rIns="91440" bIns="45720" rtlCol="0" anchor="b">
+            <a:normAutofit/>
+          </a:bodyPr>
+          <a:lstStyle/>
+          <a:p>
+            <a:r>
+              <a:rPr lang="en-US" sz="4400" dirty="0">
+                <a:solidFill>
+                  <a:schemeClr val="bg1"/>
+                </a:solidFill>
+                <a:latin typeface="Montserrat" panose="00000500000000000000" pitchFamily="2" charset="0"/>
+              </a:rPr>
+              <a:t>Design de </a:t>
+            </a:r>
+            <a:r>
+              <a:rPr lang="en-US" sz="4400" dirty="0" err="1">
+                <a:solidFill>
+                  <a:schemeClr val="bg1"/>
+                </a:solidFill>
+                <a:latin typeface="Montserrat" panose="00000500000000000000" pitchFamily="2" charset="0"/>
+              </a:rPr>
+              <a:t>l’application</a:t>
+            </a:r>
+            <a:r>
+              <a:rPr lang="en-US" sz="4400" dirty="0">
+                <a:solidFill>
+                  <a:schemeClr val="bg1"/>
+                </a:solidFill>
+                <a:latin typeface="Montserrat" panose="00000500000000000000" pitchFamily="2" charset="0"/>
+              </a:rPr>
+              <a:t> </a:t>
+            </a:r>
+          </a:p>
+        </p:txBody>
+      </p:sp>
+      <p:cxnSp>
+        <p:nvCxnSpPr>
+          <p:cNvPr id="81" name="Straight Connector 80">
+            <a:extLst>
+              <a:ext uri="{FF2B5EF4-FFF2-40B4-BE49-F238E27FC236}">
+                <a16:creationId xmlns:a16="http://schemas.microsoft.com/office/drawing/2014/main" id="{96D07482-83A3-4451-943C-B46961082957}"/>
+              </a:ext>
+              <a:ext uri="{C183D7F6-B498-43B3-948B-1728B52AA6E4}">
+                <adec:decorative xmlns:adec="http://schemas.microsoft.com/office/drawing/2017/decorative" val="1"/>
+              </a:ext>
+            </a:extLst>
+          </p:cNvPr>
+          <p:cNvCxnSpPr>
+            <a:cxnSpLocks noGrp="1" noRot="1" noChangeAspect="1" noMove="1" noResize="1" noEditPoints="1" noAdjustHandles="1" noChangeArrowheads="1" noChangeShapeType="1"/>
+          </p:cNvCxnSpPr>
+          <p:nvPr>
+            <p:extLst>
+              <p:ext uri="{386F3935-93C4-4BCD-93E2-E3B085C9AB24}">
+                <p16:designElem xmlns:p16="http://schemas.microsoft.com/office/powerpoint/2015/main" val="1"/>
+              </p:ext>
+            </p:extLst>
+          </p:nvPr>
+        </p:nvCxnSpPr>
+        <p:spPr>
+          <a:xfrm>
+            <a:off x="906950" y="4508519"/>
+            <a:ext cx="3108960" cy="0"/>
+          </a:xfrm>
+          <a:prstGeom prst="line">
+            <a:avLst/>
+          </a:prstGeom>
+          <a:ln w="19050">
+            <a:solidFill>
+              <a:schemeClr val="accent1"/>
+            </a:solidFill>
+          </a:ln>
+        </p:spPr>
+        <p:style>
+          <a:lnRef idx="1">
+            <a:schemeClr val="accent1"/>
+          </a:lnRef>
+          <a:fillRef idx="0">
+            <a:schemeClr val="accent1"/>
+          </a:fillRef>
+          <a:effectRef idx="0">
+            <a:schemeClr val="accent1"/>
+          </a:effectRef>
+          <a:fontRef idx="minor">
+            <a:schemeClr val="tx1"/>
+          </a:fontRef>
+        </p:style>
+      </p:cxnSp>
+      <p:pic>
+        <p:nvPicPr>
+          <p:cNvPr id="2052" name="Picture 4">
+            <a:extLst>
+              <a:ext uri="{FF2B5EF4-FFF2-40B4-BE49-F238E27FC236}">
+                <a16:creationId xmlns:a16="http://schemas.microsoft.com/office/drawing/2014/main" id="{6745D856-9AF1-4314-AD39-78411B831099}"/>
+              </a:ext>
+            </a:extLst>
+          </p:cNvPr>
+          <p:cNvPicPr>
+            <a:picLocks noChangeAspect="1" noChangeArrowheads="1"/>
+          </p:cNvPicPr>
+          <p:nvPr/>
+        </p:nvPicPr>
+        <p:blipFill>
+          <a:blip r:embed="rId2">
+            <a:extLst>
+              <a:ext uri="{28A0092B-C50C-407E-A947-70E740481C1C}">
+                <a14:useLocalDpi xmlns:a14="http://schemas.microsoft.com/office/drawing/2010/main" val="0"/>
+              </a:ext>
+            </a:extLst>
+          </a:blip>
+          <a:stretch>
+            <a:fillRect/>
+          </a:stretch>
+        </p:blipFill>
+        <p:spPr bwMode="auto">
+          <a:xfrm>
+            <a:off x="5234085" y="1238443"/>
+            <a:ext cx="2047202" cy="4355750"/>
+          </a:xfrm>
+          <a:prstGeom prst="rect">
+            <a:avLst/>
+          </a:prstGeom>
+          <a:noFill/>
+          <a:extLst>
+            <a:ext uri="{909E8E84-426E-40DD-AFC4-6F175D3DCCD1}">
+              <a14:hiddenFill xmlns:a14="http://schemas.microsoft.com/office/drawing/2010/main">
+                <a:solidFill>
+                  <a:srgbClr val="FFFFFF"/>
+                </a:solidFill>
+              </a14:hiddenFill>
+            </a:ext>
+          </a:extLst>
+        </p:spPr>
+      </p:pic>
+      <p:pic>
+        <p:nvPicPr>
+          <p:cNvPr id="2050" name="Picture 2">
+            <a:extLst>
+              <a:ext uri="{FF2B5EF4-FFF2-40B4-BE49-F238E27FC236}">
+                <a16:creationId xmlns:a16="http://schemas.microsoft.com/office/drawing/2014/main" id="{4361E4D9-15B7-4DCB-9EB7-BBDD20ED56AA}"/>
+              </a:ext>
+            </a:extLst>
+          </p:cNvPr>
+          <p:cNvPicPr>
+            <a:picLocks noChangeAspect="1" noChangeArrowheads="1"/>
+          </p:cNvPicPr>
+          <p:nvPr/>
+        </p:nvPicPr>
+        <p:blipFill>
+          <a:blip r:embed="rId3">
+            <a:extLst>
+              <a:ext uri="{28A0092B-C50C-407E-A947-70E740481C1C}">
+                <a14:useLocalDpi xmlns:a14="http://schemas.microsoft.com/office/drawing/2010/main" val="0"/>
+              </a:ext>
+            </a:extLst>
+          </a:blip>
+          <a:stretch>
+            <a:fillRect/>
+          </a:stretch>
+        </p:blipFill>
+        <p:spPr bwMode="auto">
+          <a:xfrm>
+            <a:off x="8866199" y="1238442"/>
+            <a:ext cx="2047202" cy="4355750"/>
+          </a:xfrm>
+          <a:prstGeom prst="rect">
+            <a:avLst/>
+          </a:prstGeom>
+          <a:noFill/>
+          <a:extLst>
+            <a:ext uri="{909E8E84-426E-40DD-AFC4-6F175D3DCCD1}">
+              <a14:hiddenFill xmlns:a14="http://schemas.microsoft.com/office/drawing/2010/main">
+                <a:solidFill>
+                  <a:srgbClr val="FFFFFF"/>
+                </a:solidFill>
+              </a14:hiddenFill>
+            </a:ext>
+          </a:extLst>
+        </p:spPr>
+      </p:pic>
+      <p:sp>
+        <p:nvSpPr>
+          <p:cNvPr id="83" name="Rectangle 82">
+            <a:extLst>
+              <a:ext uri="{FF2B5EF4-FFF2-40B4-BE49-F238E27FC236}">
+                <a16:creationId xmlns:a16="http://schemas.microsoft.com/office/drawing/2014/main" id="{E239D8CC-16F4-4B2B-80F0-203C56D0D2DE}"/>
+              </a:ext>
+              <a:ext uri="{C183D7F6-B498-43B3-948B-1728B52AA6E4}">
+                <adec:decorative xmlns:adec="http://schemas.microsoft.com/office/drawing/2017/decorative" val="1"/>
+              </a:ext>
+            </a:extLst>
+          </p:cNvPr>
+          <p:cNvSpPr>
+            <a:spLocks noGrp="1" noRot="1" noChangeAspect="1" noMove="1" noResize="1" noEditPoints="1" noAdjustHandles="1" noChangeArrowheads="1" noChangeShapeType="1" noTextEdit="1"/>
+          </p:cNvSpPr>
+          <p:nvPr>
+            <p:extLst>
+              <p:ext uri="{386F3935-93C4-4BCD-93E2-E3B085C9AB24}">
+                <p16:designElem xmlns:p16="http://schemas.microsoft.com/office/powerpoint/2015/main" val="1"/>
+              </p:ext>
+            </p:extLst>
+          </p:nvPr>
+        </p:nvSpPr>
+        <p:spPr>
+          <a:xfrm>
+            <a:off x="1" y="6400800"/>
+            <a:ext cx="12192000" cy="457200"/>
+          </a:xfrm>
+          <a:prstGeom prst="rect">
+            <a:avLst/>
+          </a:prstGeom>
+          <a:solidFill>
+            <a:srgbClr val="262626">
+              <a:alpha val="95000"/>
+            </a:srgbClr>
+          </a:solidFill>
+          <a:ln>
+            <a:noFill/>
+          </a:ln>
+        </p:spPr>
+        <p:style>
+          <a:lnRef idx="2">
+            <a:schemeClr val="accent1">
+              <a:shade val="50000"/>
+            </a:schemeClr>
+          </a:lnRef>
+          <a:fillRef idx="1">
+            <a:schemeClr val="accent1"/>
+          </a:fillRef>
+          <a:effectRef idx="0">
+            <a:schemeClr val="accent1"/>
+          </a:effectRef>
+          <a:fontRef idx="minor">
+            <a:schemeClr val="lt1"/>
+          </a:fontRef>
+        </p:style>
+      </p:sp>
+    </p:spTree>
+    <p:extLst>
+      <p:ext uri="{BB962C8B-B14F-4D97-AF65-F5344CB8AC3E}">
+        <p14:creationId xmlns:p14="http://schemas.microsoft.com/office/powerpoint/2010/main" val="4152395468"/>
       </p:ext>
     </p:extLst>
   </p:cSld>

</xml_diff>